<commit_message>
Added label to Deck for card count; refactored how deck is initialized
</commit_message>
<xml_diff>
--- a/Docs/MTG Object Model.pptx
+++ b/Docs/MTG Object Model.pptx
@@ -6,6 +6,7 @@
   </p:sldMasterIdLst>
   <p:sldIdLst>
     <p:sldId id="257" r:id="rId2"/>
+    <p:sldId id="258" r:id="rId3"/>
   </p:sldIdLst>
   <p:sldSz cx="12192000" cy="6858000"/>
   <p:notesSz cx="6858000" cy="9144000"/>
@@ -104,6 +105,11 @@
       </a:defRPr>
     </a:lvl9pPr>
   </p:defaultTextStyle>
+  <p:extLst>
+    <p:ext uri="{EFAFB233-063F-42B5-8137-9DF3F51BA10A}">
+      <p15:sldGuideLst xmlns:p15="http://schemas.microsoft.com/office/powerpoint/2012/main"/>
+    </p:ext>
+  </p:extLst>
 </p:presentation>
 </file>
 
@@ -258,7 +264,7 @@
           <a:p>
             <a:fld id="{0C15D9BA-376D-4A22-8DF4-16B8E6B2EF2C}" type="datetimeFigureOut">
               <a:rPr lang="en-US" smtClean="0"/>
-              <a:t>9/15/2017</a:t>
+              <a:t>9/16/2017</a:t>
             </a:fld>
             <a:endParaRPr lang="en-US"/>
           </a:p>
@@ -456,7 +462,7 @@
           <a:p>
             <a:fld id="{0C15D9BA-376D-4A22-8DF4-16B8E6B2EF2C}" type="datetimeFigureOut">
               <a:rPr lang="en-US" smtClean="0"/>
-              <a:t>9/15/2017</a:t>
+              <a:t>9/16/2017</a:t>
             </a:fld>
             <a:endParaRPr lang="en-US"/>
           </a:p>
@@ -664,7 +670,7 @@
           <a:p>
             <a:fld id="{0C15D9BA-376D-4A22-8DF4-16B8E6B2EF2C}" type="datetimeFigureOut">
               <a:rPr lang="en-US" smtClean="0"/>
-              <a:t>9/15/2017</a:t>
+              <a:t>9/16/2017</a:t>
             </a:fld>
             <a:endParaRPr lang="en-US"/>
           </a:p>
@@ -862,7 +868,7 @@
           <a:p>
             <a:fld id="{0C15D9BA-376D-4A22-8DF4-16B8E6B2EF2C}" type="datetimeFigureOut">
               <a:rPr lang="en-US" smtClean="0"/>
-              <a:t>9/15/2017</a:t>
+              <a:t>9/16/2017</a:t>
             </a:fld>
             <a:endParaRPr lang="en-US"/>
           </a:p>
@@ -1137,7 +1143,7 @@
           <a:p>
             <a:fld id="{0C15D9BA-376D-4A22-8DF4-16B8E6B2EF2C}" type="datetimeFigureOut">
               <a:rPr lang="en-US" smtClean="0"/>
-              <a:t>9/15/2017</a:t>
+              <a:t>9/16/2017</a:t>
             </a:fld>
             <a:endParaRPr lang="en-US"/>
           </a:p>
@@ -1402,7 +1408,7 @@
           <a:p>
             <a:fld id="{0C15D9BA-376D-4A22-8DF4-16B8E6B2EF2C}" type="datetimeFigureOut">
               <a:rPr lang="en-US" smtClean="0"/>
-              <a:t>9/15/2017</a:t>
+              <a:t>9/16/2017</a:t>
             </a:fld>
             <a:endParaRPr lang="en-US"/>
           </a:p>
@@ -1814,7 +1820,7 @@
           <a:p>
             <a:fld id="{0C15D9BA-376D-4A22-8DF4-16B8E6B2EF2C}" type="datetimeFigureOut">
               <a:rPr lang="en-US" smtClean="0"/>
-              <a:t>9/15/2017</a:t>
+              <a:t>9/16/2017</a:t>
             </a:fld>
             <a:endParaRPr lang="en-US"/>
           </a:p>
@@ -1955,7 +1961,7 @@
           <a:p>
             <a:fld id="{0C15D9BA-376D-4A22-8DF4-16B8E6B2EF2C}" type="datetimeFigureOut">
               <a:rPr lang="en-US" smtClean="0"/>
-              <a:t>9/15/2017</a:t>
+              <a:t>9/16/2017</a:t>
             </a:fld>
             <a:endParaRPr lang="en-US"/>
           </a:p>
@@ -2068,7 +2074,7 @@
           <a:p>
             <a:fld id="{0C15D9BA-376D-4A22-8DF4-16B8E6B2EF2C}" type="datetimeFigureOut">
               <a:rPr lang="en-US" smtClean="0"/>
-              <a:t>9/15/2017</a:t>
+              <a:t>9/16/2017</a:t>
             </a:fld>
             <a:endParaRPr lang="en-US"/>
           </a:p>
@@ -2379,7 +2385,7 @@
           <a:p>
             <a:fld id="{0C15D9BA-376D-4A22-8DF4-16B8E6B2EF2C}" type="datetimeFigureOut">
               <a:rPr lang="en-US" smtClean="0"/>
-              <a:t>9/15/2017</a:t>
+              <a:t>9/16/2017</a:t>
             </a:fld>
             <a:endParaRPr lang="en-US"/>
           </a:p>
@@ -2667,7 +2673,7 @@
           <a:p>
             <a:fld id="{0C15D9BA-376D-4A22-8DF4-16B8E6B2EF2C}" type="datetimeFigureOut">
               <a:rPr lang="en-US" smtClean="0"/>
-              <a:t>9/15/2017</a:t>
+              <a:t>9/16/2017</a:t>
             </a:fld>
             <a:endParaRPr lang="en-US"/>
           </a:p>
@@ -2908,7 +2914,7 @@
           <a:p>
             <a:fld id="{0C15D9BA-376D-4A22-8DF4-16B8E6B2EF2C}" type="datetimeFigureOut">
               <a:rPr lang="en-US" smtClean="0"/>
-              <a:t>9/15/2017</a:t>
+              <a:t>9/16/2017</a:t>
             </a:fld>
             <a:endParaRPr lang="en-US"/>
           </a:p>
@@ -3367,7 +3373,7 @@
             <a:pPr algn="ctr"/>
             <a:r>
               <a:rPr lang="en-US" sz="1400" u="sng" dirty="0" err="1"/>
-              <a:t>MTGCardBase</a:t>
+              <a:t>MTGCard</a:t>
             </a:r>
             <a:endParaRPr lang="en-US" u="sng" dirty="0"/>
           </a:p>
@@ -3447,6 +3453,1115 @@
     <p:extLst>
       <p:ext uri="{BB962C8B-B14F-4D97-AF65-F5344CB8AC3E}">
         <p14:creationId xmlns:p14="http://schemas.microsoft.com/office/powerpoint/2010/main" val="926721292"/>
+      </p:ext>
+    </p:extLst>
+  </p:cSld>
+  <p:clrMapOvr>
+    <a:masterClrMapping/>
+  </p:clrMapOvr>
+</p:sld>
+</file>
+
+<file path=ppt/slides/slide2.xml><?xml version="1.0" encoding="utf-8"?>
+<p:sld xmlns:a="http://schemas.openxmlformats.org/drawingml/2006/main" xmlns:r="http://schemas.openxmlformats.org/officeDocument/2006/relationships" xmlns:p="http://schemas.openxmlformats.org/presentationml/2006/main">
+  <p:cSld>
+    <p:spTree>
+      <p:nvGrpSpPr>
+        <p:cNvPr id="1" name=""/>
+        <p:cNvGrpSpPr/>
+        <p:nvPr/>
+      </p:nvGrpSpPr>
+      <p:grpSpPr>
+        <a:xfrm>
+          <a:off x="0" y="0"/>
+          <a:ext cx="0" cy="0"/>
+          <a:chOff x="0" y="0"/>
+          <a:chExt cx="0" cy="0"/>
+        </a:xfrm>
+      </p:grpSpPr>
+      <p:sp>
+        <p:nvSpPr>
+          <p:cNvPr id="2" name="Rectangle 1">
+            <a:extLst>
+              <a:ext uri="{FF2B5EF4-FFF2-40B4-BE49-F238E27FC236}">
+                <a16:creationId xmlns:a16="http://schemas.microsoft.com/office/drawing/2014/main" id="{4DB96E2C-3CB2-4380-9447-9A03DDC61E13}"/>
+              </a:ext>
+            </a:extLst>
+          </p:cNvPr>
+          <p:cNvSpPr/>
+          <p:nvPr/>
+        </p:nvSpPr>
+        <p:spPr>
+          <a:xfrm>
+            <a:off x="4797910" y="699249"/>
+            <a:ext cx="2011679" cy="1054249"/>
+          </a:xfrm>
+          <a:prstGeom prst="rect">
+            <a:avLst/>
+          </a:prstGeom>
+        </p:spPr>
+        <p:style>
+          <a:lnRef idx="2">
+            <a:schemeClr val="dk1"/>
+          </a:lnRef>
+          <a:fillRef idx="1">
+            <a:schemeClr val="lt1"/>
+          </a:fillRef>
+          <a:effectRef idx="0">
+            <a:schemeClr val="dk1"/>
+          </a:effectRef>
+          <a:fontRef idx="minor">
+            <a:schemeClr val="dk1"/>
+          </a:fontRef>
+        </p:style>
+        <p:txBody>
+          <a:bodyPr rtlCol="0" anchor="ctr"/>
+          <a:lstStyle/>
+          <a:p>
+            <a:pPr algn="ctr"/>
+            <a:r>
+              <a:rPr lang="en-US" sz="1400" b="1" dirty="0" err="1"/>
+              <a:t>MTGCard</a:t>
+            </a:r>
+            <a:endParaRPr lang="en-US" b="1" dirty="0"/>
+          </a:p>
+          <a:p>
+            <a:pPr algn="ctr"/>
+            <a:endParaRPr lang="en-US" dirty="0"/>
+          </a:p>
+          <a:p>
+            <a:pPr algn="ctr"/>
+            <a:endParaRPr lang="en-US" dirty="0"/>
+          </a:p>
+          <a:p>
+            <a:pPr algn="ctr"/>
+            <a:endParaRPr lang="en-US" dirty="0"/>
+          </a:p>
+        </p:txBody>
+      </p:sp>
+      <p:sp>
+        <p:nvSpPr>
+          <p:cNvPr id="4" name="Rectangle 3">
+            <a:extLst>
+              <a:ext uri="{FF2B5EF4-FFF2-40B4-BE49-F238E27FC236}">
+                <a16:creationId xmlns:a16="http://schemas.microsoft.com/office/drawing/2014/main" id="{B8D8AC59-0998-4A53-9705-C17D3A707C2B}"/>
+              </a:ext>
+            </a:extLst>
+          </p:cNvPr>
+          <p:cNvSpPr/>
+          <p:nvPr/>
+        </p:nvSpPr>
+        <p:spPr>
+          <a:xfrm>
+            <a:off x="3564369" y="2519080"/>
+            <a:ext cx="1730187" cy="1149276"/>
+          </a:xfrm>
+          <a:prstGeom prst="rect">
+            <a:avLst/>
+          </a:prstGeom>
+        </p:spPr>
+        <p:style>
+          <a:lnRef idx="2">
+            <a:schemeClr val="dk1"/>
+          </a:lnRef>
+          <a:fillRef idx="1">
+            <a:schemeClr val="lt1"/>
+          </a:fillRef>
+          <a:effectRef idx="0">
+            <a:schemeClr val="dk1"/>
+          </a:effectRef>
+          <a:fontRef idx="minor">
+            <a:schemeClr val="dk1"/>
+          </a:fontRef>
+        </p:style>
+        <p:txBody>
+          <a:bodyPr rtlCol="0" anchor="ctr"/>
+          <a:lstStyle/>
+          <a:p>
+            <a:pPr algn="ctr"/>
+            <a:r>
+              <a:rPr lang="en-US" sz="1400" b="1" dirty="0" err="1"/>
+              <a:t>MTGCardCreature</a:t>
+            </a:r>
+            <a:endParaRPr lang="en-US" b="1" dirty="0"/>
+          </a:p>
+          <a:p>
+            <a:pPr algn="ctr"/>
+            <a:endParaRPr lang="en-US" dirty="0"/>
+          </a:p>
+          <a:p>
+            <a:pPr algn="ctr"/>
+            <a:endParaRPr lang="en-US" dirty="0"/>
+          </a:p>
+          <a:p>
+            <a:pPr algn="ctr"/>
+            <a:endParaRPr lang="en-US" dirty="0"/>
+          </a:p>
+        </p:txBody>
+      </p:sp>
+      <p:sp>
+        <p:nvSpPr>
+          <p:cNvPr id="5" name="Isosceles Triangle 4">
+            <a:extLst>
+              <a:ext uri="{FF2B5EF4-FFF2-40B4-BE49-F238E27FC236}">
+                <a16:creationId xmlns:a16="http://schemas.microsoft.com/office/drawing/2014/main" id="{008B69ED-5440-4038-8FBB-3A8F8ED8AA1D}"/>
+              </a:ext>
+            </a:extLst>
+          </p:cNvPr>
+          <p:cNvSpPr/>
+          <p:nvPr/>
+        </p:nvSpPr>
+        <p:spPr>
+          <a:xfrm>
+            <a:off x="6246609" y="1753498"/>
+            <a:ext cx="161364" cy="193637"/>
+          </a:xfrm>
+          <a:prstGeom prst="triangle">
+            <a:avLst/>
+          </a:prstGeom>
+        </p:spPr>
+        <p:style>
+          <a:lnRef idx="2">
+            <a:schemeClr val="dk1"/>
+          </a:lnRef>
+          <a:fillRef idx="1">
+            <a:schemeClr val="lt1"/>
+          </a:fillRef>
+          <a:effectRef idx="0">
+            <a:schemeClr val="dk1"/>
+          </a:effectRef>
+          <a:fontRef idx="minor">
+            <a:schemeClr val="dk1"/>
+          </a:fontRef>
+        </p:style>
+        <p:txBody>
+          <a:bodyPr rtlCol="0" anchor="ctr"/>
+          <a:lstStyle/>
+          <a:p>
+            <a:pPr algn="ctr"/>
+            <a:endParaRPr lang="en-US"/>
+          </a:p>
+        </p:txBody>
+      </p:sp>
+      <p:sp>
+        <p:nvSpPr>
+          <p:cNvPr id="6" name="Isosceles Triangle 5">
+            <a:extLst>
+              <a:ext uri="{FF2B5EF4-FFF2-40B4-BE49-F238E27FC236}">
+                <a16:creationId xmlns:a16="http://schemas.microsoft.com/office/drawing/2014/main" id="{FEDEC58C-6FB8-49C0-B7D3-0B94614CBCE0}"/>
+              </a:ext>
+            </a:extLst>
+          </p:cNvPr>
+          <p:cNvSpPr/>
+          <p:nvPr/>
+        </p:nvSpPr>
+        <p:spPr>
+          <a:xfrm>
+            <a:off x="5233599" y="1753498"/>
+            <a:ext cx="161364" cy="193637"/>
+          </a:xfrm>
+          <a:prstGeom prst="triangle">
+            <a:avLst/>
+          </a:prstGeom>
+        </p:spPr>
+        <p:style>
+          <a:lnRef idx="2">
+            <a:schemeClr val="dk1"/>
+          </a:lnRef>
+          <a:fillRef idx="1">
+            <a:schemeClr val="lt1"/>
+          </a:fillRef>
+          <a:effectRef idx="0">
+            <a:schemeClr val="dk1"/>
+          </a:effectRef>
+          <a:fontRef idx="minor">
+            <a:schemeClr val="dk1"/>
+          </a:fontRef>
+        </p:style>
+        <p:txBody>
+          <a:bodyPr rtlCol="0" anchor="ctr"/>
+          <a:lstStyle/>
+          <a:p>
+            <a:pPr algn="ctr"/>
+            <a:endParaRPr lang="en-US"/>
+          </a:p>
+        </p:txBody>
+      </p:sp>
+      <p:cxnSp>
+        <p:nvCxnSpPr>
+          <p:cNvPr id="8" name="Connector: Elbow 7">
+            <a:extLst>
+              <a:ext uri="{FF2B5EF4-FFF2-40B4-BE49-F238E27FC236}">
+                <a16:creationId xmlns:a16="http://schemas.microsoft.com/office/drawing/2014/main" id="{0A7EB033-BBFA-43A7-A882-8BA3CEB239EB}"/>
+              </a:ext>
+            </a:extLst>
+          </p:cNvPr>
+          <p:cNvCxnSpPr>
+            <a:stCxn id="3" idx="0"/>
+            <a:endCxn id="5" idx="3"/>
+          </p:cNvCxnSpPr>
+          <p:nvPr/>
+        </p:nvCxnSpPr>
+        <p:spPr>
+          <a:xfrm rot="16200000" flipV="1">
+            <a:off x="6473866" y="1800561"/>
+            <a:ext cx="571945" cy="865094"/>
+          </a:xfrm>
+          <a:prstGeom prst="bentConnector3">
+            <a:avLst/>
+          </a:prstGeom>
+          <a:ln>
+            <a:solidFill>
+              <a:schemeClr val="tx1"/>
+            </a:solidFill>
+          </a:ln>
+        </p:spPr>
+        <p:style>
+          <a:lnRef idx="1">
+            <a:schemeClr val="accent1"/>
+          </a:lnRef>
+          <a:fillRef idx="0">
+            <a:schemeClr val="accent1"/>
+          </a:fillRef>
+          <a:effectRef idx="0">
+            <a:schemeClr val="accent1"/>
+          </a:effectRef>
+          <a:fontRef idx="minor">
+            <a:schemeClr val="tx1"/>
+          </a:fontRef>
+        </p:style>
+      </p:cxnSp>
+      <p:cxnSp>
+        <p:nvCxnSpPr>
+          <p:cNvPr id="10" name="Connector: Elbow 9">
+            <a:extLst>
+              <a:ext uri="{FF2B5EF4-FFF2-40B4-BE49-F238E27FC236}">
+                <a16:creationId xmlns:a16="http://schemas.microsoft.com/office/drawing/2014/main" id="{8C925BAD-EF4D-41F7-9C6F-E53435909384}"/>
+              </a:ext>
+            </a:extLst>
+          </p:cNvPr>
+          <p:cNvCxnSpPr>
+            <a:stCxn id="4" idx="0"/>
+            <a:endCxn id="6" idx="3"/>
+          </p:cNvCxnSpPr>
+          <p:nvPr/>
+        </p:nvCxnSpPr>
+        <p:spPr>
+          <a:xfrm rot="5400000" flipH="1" flipV="1">
+            <a:off x="4585900" y="1790699"/>
+            <a:ext cx="571945" cy="884818"/>
+          </a:xfrm>
+          <a:prstGeom prst="bentConnector3">
+            <a:avLst/>
+          </a:prstGeom>
+          <a:ln>
+            <a:solidFill>
+              <a:schemeClr val="tx1"/>
+            </a:solidFill>
+          </a:ln>
+        </p:spPr>
+        <p:style>
+          <a:lnRef idx="1">
+            <a:schemeClr val="accent1"/>
+          </a:lnRef>
+          <a:fillRef idx="0">
+            <a:schemeClr val="accent1"/>
+          </a:fillRef>
+          <a:effectRef idx="0">
+            <a:schemeClr val="accent1"/>
+          </a:effectRef>
+          <a:fontRef idx="minor">
+            <a:schemeClr val="tx1"/>
+          </a:fontRef>
+        </p:style>
+      </p:cxnSp>
+      <p:grpSp>
+        <p:nvGrpSpPr>
+          <p:cNvPr id="39" name="Group 38">
+            <a:extLst>
+              <a:ext uri="{FF2B5EF4-FFF2-40B4-BE49-F238E27FC236}">
+                <a16:creationId xmlns:a16="http://schemas.microsoft.com/office/drawing/2014/main" id="{81AFFFB2-CDF9-4BDD-8BCB-CDCF31F743C9}"/>
+              </a:ext>
+            </a:extLst>
+          </p:cNvPr>
+          <p:cNvGrpSpPr/>
+          <p:nvPr/>
+        </p:nvGrpSpPr>
+        <p:grpSpPr>
+          <a:xfrm>
+            <a:off x="6327291" y="2519080"/>
+            <a:ext cx="1730187" cy="1149276"/>
+            <a:chOff x="6327291" y="2519080"/>
+            <a:chExt cx="1730187" cy="1149276"/>
+          </a:xfrm>
+        </p:grpSpPr>
+        <p:sp>
+          <p:nvSpPr>
+            <p:cNvPr id="3" name="Rectangle 2">
+              <a:extLst>
+                <a:ext uri="{FF2B5EF4-FFF2-40B4-BE49-F238E27FC236}">
+                  <a16:creationId xmlns:a16="http://schemas.microsoft.com/office/drawing/2014/main" id="{F44C7573-A284-47D1-B367-2FCB1FBB7D3D}"/>
+                </a:ext>
+              </a:extLst>
+            </p:cNvPr>
+            <p:cNvSpPr/>
+            <p:nvPr/>
+          </p:nvSpPr>
+          <p:spPr>
+            <a:xfrm>
+              <a:off x="6327291" y="2519080"/>
+              <a:ext cx="1730187" cy="1149276"/>
+            </a:xfrm>
+            <a:prstGeom prst="rect">
+              <a:avLst/>
+            </a:prstGeom>
+          </p:spPr>
+          <p:style>
+            <a:lnRef idx="2">
+              <a:schemeClr val="dk1"/>
+            </a:lnRef>
+            <a:fillRef idx="1">
+              <a:schemeClr val="lt1"/>
+            </a:fillRef>
+            <a:effectRef idx="0">
+              <a:schemeClr val="dk1"/>
+            </a:effectRef>
+            <a:fontRef idx="minor">
+              <a:schemeClr val="dk1"/>
+            </a:fontRef>
+          </p:style>
+          <p:txBody>
+            <a:bodyPr rtlCol="0" anchor="ctr"/>
+            <a:lstStyle/>
+            <a:p>
+              <a:pPr algn="ctr"/>
+              <a:r>
+                <a:rPr lang="en-US" sz="1400" b="1" i="1" dirty="0" err="1"/>
+                <a:t>MTGCardDecorator</a:t>
+              </a:r>
+              <a:endParaRPr lang="en-US" b="1" i="1" dirty="0"/>
+            </a:p>
+            <a:p>
+              <a:pPr algn="ctr"/>
+              <a:endParaRPr lang="en-US" dirty="0"/>
+            </a:p>
+            <a:p>
+              <a:pPr algn="ctr"/>
+              <a:endParaRPr lang="en-US" dirty="0"/>
+            </a:p>
+            <a:p>
+              <a:pPr algn="ctr"/>
+              <a:endParaRPr lang="en-US" dirty="0"/>
+            </a:p>
+          </p:txBody>
+        </p:sp>
+        <p:cxnSp>
+          <p:nvCxnSpPr>
+            <p:cNvPr id="13" name="Straight Connector 12">
+              <a:extLst>
+                <a:ext uri="{FF2B5EF4-FFF2-40B4-BE49-F238E27FC236}">
+                  <a16:creationId xmlns:a16="http://schemas.microsoft.com/office/drawing/2014/main" id="{036E11E3-5D02-4998-85BF-9592F2300279}"/>
+                </a:ext>
+              </a:extLst>
+            </p:cNvPr>
+            <p:cNvCxnSpPr/>
+            <p:nvPr/>
+          </p:nvCxnSpPr>
+          <p:spPr>
+            <a:xfrm>
+              <a:off x="6327291" y="2840019"/>
+              <a:ext cx="1730187" cy="0"/>
+            </a:xfrm>
+            <a:prstGeom prst="line">
+              <a:avLst/>
+            </a:prstGeom>
+            <a:ln>
+              <a:solidFill>
+                <a:schemeClr val="tx1"/>
+              </a:solidFill>
+            </a:ln>
+          </p:spPr>
+          <p:style>
+            <a:lnRef idx="1">
+              <a:schemeClr val="accent1"/>
+            </a:lnRef>
+            <a:fillRef idx="0">
+              <a:schemeClr val="accent1"/>
+            </a:fillRef>
+            <a:effectRef idx="0">
+              <a:schemeClr val="accent1"/>
+            </a:effectRef>
+            <a:fontRef idx="minor">
+              <a:schemeClr val="tx1"/>
+            </a:fontRef>
+          </p:style>
+        </p:cxnSp>
+      </p:grpSp>
+      <p:cxnSp>
+        <p:nvCxnSpPr>
+          <p:cNvPr id="14" name="Straight Connector 13">
+            <a:extLst>
+              <a:ext uri="{FF2B5EF4-FFF2-40B4-BE49-F238E27FC236}">
+                <a16:creationId xmlns:a16="http://schemas.microsoft.com/office/drawing/2014/main" id="{28EACA2E-17ED-4305-9B66-377926E1EF74}"/>
+              </a:ext>
+            </a:extLst>
+          </p:cNvPr>
+          <p:cNvCxnSpPr/>
+          <p:nvPr/>
+        </p:nvCxnSpPr>
+        <p:spPr>
+          <a:xfrm>
+            <a:off x="3564368" y="2840019"/>
+            <a:ext cx="1730187" cy="0"/>
+          </a:xfrm>
+          <a:prstGeom prst="line">
+            <a:avLst/>
+          </a:prstGeom>
+          <a:ln>
+            <a:solidFill>
+              <a:schemeClr val="tx1"/>
+            </a:solidFill>
+          </a:ln>
+        </p:spPr>
+        <p:style>
+          <a:lnRef idx="1">
+            <a:schemeClr val="accent1"/>
+          </a:lnRef>
+          <a:fillRef idx="0">
+            <a:schemeClr val="accent1"/>
+          </a:fillRef>
+          <a:effectRef idx="0">
+            <a:schemeClr val="accent1"/>
+          </a:effectRef>
+          <a:fontRef idx="minor">
+            <a:schemeClr val="tx1"/>
+          </a:fontRef>
+        </p:style>
+      </p:cxnSp>
+      <p:cxnSp>
+        <p:nvCxnSpPr>
+          <p:cNvPr id="15" name="Straight Connector 14">
+            <a:extLst>
+              <a:ext uri="{FF2B5EF4-FFF2-40B4-BE49-F238E27FC236}">
+                <a16:creationId xmlns:a16="http://schemas.microsoft.com/office/drawing/2014/main" id="{1D239B39-4488-4187-A622-2185477AC74B}"/>
+              </a:ext>
+            </a:extLst>
+          </p:cNvPr>
+          <p:cNvCxnSpPr>
+            <a:cxnSpLocks/>
+          </p:cNvCxnSpPr>
+          <p:nvPr/>
+        </p:nvCxnSpPr>
+        <p:spPr>
+          <a:xfrm>
+            <a:off x="4806881" y="969981"/>
+            <a:ext cx="2002708" cy="0"/>
+          </a:xfrm>
+          <a:prstGeom prst="line">
+            <a:avLst/>
+          </a:prstGeom>
+          <a:ln>
+            <a:solidFill>
+              <a:schemeClr val="tx1"/>
+            </a:solidFill>
+          </a:ln>
+        </p:spPr>
+        <p:style>
+          <a:lnRef idx="1">
+            <a:schemeClr val="accent1"/>
+          </a:lnRef>
+          <a:fillRef idx="0">
+            <a:schemeClr val="accent1"/>
+          </a:fillRef>
+          <a:effectRef idx="0">
+            <a:schemeClr val="accent1"/>
+          </a:effectRef>
+          <a:fontRef idx="minor">
+            <a:schemeClr val="tx1"/>
+          </a:fontRef>
+        </p:style>
+      </p:cxnSp>
+      <p:grpSp>
+        <p:nvGrpSpPr>
+          <p:cNvPr id="38" name="Group 37">
+            <a:extLst>
+              <a:ext uri="{FF2B5EF4-FFF2-40B4-BE49-F238E27FC236}">
+                <a16:creationId xmlns:a16="http://schemas.microsoft.com/office/drawing/2014/main" id="{AE96709D-03C0-4AB8-B6AB-A1E9946B9E1E}"/>
+              </a:ext>
+            </a:extLst>
+          </p:cNvPr>
+          <p:cNvGrpSpPr/>
+          <p:nvPr/>
+        </p:nvGrpSpPr>
+        <p:grpSpPr>
+          <a:xfrm>
+            <a:off x="6809589" y="860612"/>
+            <a:ext cx="1839560" cy="1839557"/>
+            <a:chOff x="6809589" y="860612"/>
+            <a:chExt cx="1839560" cy="1839557"/>
+          </a:xfrm>
+        </p:grpSpPr>
+        <p:cxnSp>
+          <p:nvCxnSpPr>
+            <p:cNvPr id="28" name="Straight Connector 27">
+              <a:extLst>
+                <a:ext uri="{FF2B5EF4-FFF2-40B4-BE49-F238E27FC236}">
+                  <a16:creationId xmlns:a16="http://schemas.microsoft.com/office/drawing/2014/main" id="{9DFF658F-D5BC-49FB-8973-4FEAC4EA67B0}"/>
+                </a:ext>
+              </a:extLst>
+            </p:cNvPr>
+            <p:cNvCxnSpPr>
+              <a:cxnSpLocks/>
+            </p:cNvCxnSpPr>
+            <p:nvPr/>
+          </p:nvCxnSpPr>
+          <p:spPr>
+            <a:xfrm>
+              <a:off x="8057478" y="2700169"/>
+              <a:ext cx="591670" cy="0"/>
+            </a:xfrm>
+            <a:prstGeom prst="line">
+              <a:avLst/>
+            </a:prstGeom>
+            <a:ln>
+              <a:solidFill>
+                <a:schemeClr val="tx1"/>
+              </a:solidFill>
+            </a:ln>
+          </p:spPr>
+          <p:style>
+            <a:lnRef idx="1">
+              <a:schemeClr val="accent1"/>
+            </a:lnRef>
+            <a:fillRef idx="0">
+              <a:schemeClr val="accent1"/>
+            </a:fillRef>
+            <a:effectRef idx="0">
+              <a:schemeClr val="accent1"/>
+            </a:effectRef>
+            <a:fontRef idx="minor">
+              <a:schemeClr val="tx1"/>
+            </a:fontRef>
+          </p:style>
+        </p:cxnSp>
+        <p:cxnSp>
+          <p:nvCxnSpPr>
+            <p:cNvPr id="30" name="Straight Connector 29">
+              <a:extLst>
+                <a:ext uri="{FF2B5EF4-FFF2-40B4-BE49-F238E27FC236}">
+                  <a16:creationId xmlns:a16="http://schemas.microsoft.com/office/drawing/2014/main" id="{8CF02AD2-741D-49ED-A467-252E14699C13}"/>
+                </a:ext>
+              </a:extLst>
+            </p:cNvPr>
+            <p:cNvCxnSpPr>
+              <a:cxnSpLocks/>
+            </p:cNvCxnSpPr>
+            <p:nvPr/>
+          </p:nvCxnSpPr>
+          <p:spPr>
+            <a:xfrm flipH="1" flipV="1">
+              <a:off x="8649148" y="860613"/>
+              <a:ext cx="1" cy="1839556"/>
+            </a:xfrm>
+            <a:prstGeom prst="line">
+              <a:avLst/>
+            </a:prstGeom>
+            <a:ln>
+              <a:solidFill>
+                <a:schemeClr val="tx1"/>
+              </a:solidFill>
+            </a:ln>
+          </p:spPr>
+          <p:style>
+            <a:lnRef idx="1">
+              <a:schemeClr val="accent1"/>
+            </a:lnRef>
+            <a:fillRef idx="0">
+              <a:schemeClr val="accent1"/>
+            </a:fillRef>
+            <a:effectRef idx="0">
+              <a:schemeClr val="accent1"/>
+            </a:effectRef>
+            <a:fontRef idx="minor">
+              <a:schemeClr val="tx1"/>
+            </a:fontRef>
+          </p:style>
+        </p:cxnSp>
+        <p:cxnSp>
+          <p:nvCxnSpPr>
+            <p:cNvPr id="32" name="Straight Arrow Connector 31">
+              <a:extLst>
+                <a:ext uri="{FF2B5EF4-FFF2-40B4-BE49-F238E27FC236}">
+                  <a16:creationId xmlns:a16="http://schemas.microsoft.com/office/drawing/2014/main" id="{9025B592-905A-4343-8E18-DFC8FF9C2DED}"/>
+                </a:ext>
+              </a:extLst>
+            </p:cNvPr>
+            <p:cNvCxnSpPr>
+              <a:cxnSpLocks/>
+            </p:cNvCxnSpPr>
+            <p:nvPr/>
+          </p:nvCxnSpPr>
+          <p:spPr>
+            <a:xfrm flipH="1" flipV="1">
+              <a:off x="6809589" y="860612"/>
+              <a:ext cx="1839560" cy="1"/>
+            </a:xfrm>
+            <a:prstGeom prst="straightConnector1">
+              <a:avLst/>
+            </a:prstGeom>
+            <a:ln>
+              <a:solidFill>
+                <a:schemeClr val="tx1"/>
+              </a:solidFill>
+              <a:tailEnd type="triangle"/>
+            </a:ln>
+          </p:spPr>
+          <p:style>
+            <a:lnRef idx="1">
+              <a:schemeClr val="accent1"/>
+            </a:lnRef>
+            <a:fillRef idx="0">
+              <a:schemeClr val="accent1"/>
+            </a:fillRef>
+            <a:effectRef idx="0">
+              <a:schemeClr val="accent1"/>
+            </a:effectRef>
+            <a:fontRef idx="minor">
+              <a:schemeClr val="tx1"/>
+            </a:fontRef>
+          </p:style>
+        </p:cxnSp>
+      </p:grpSp>
+      <p:grpSp>
+        <p:nvGrpSpPr>
+          <p:cNvPr id="57" name="Group 56">
+            <a:extLst>
+              <a:ext uri="{FF2B5EF4-FFF2-40B4-BE49-F238E27FC236}">
+                <a16:creationId xmlns:a16="http://schemas.microsoft.com/office/drawing/2014/main" id="{5EA127E2-D5E5-407D-910A-B8D7AB21ED52}"/>
+              </a:ext>
+            </a:extLst>
+          </p:cNvPr>
+          <p:cNvGrpSpPr/>
+          <p:nvPr/>
+        </p:nvGrpSpPr>
+        <p:grpSpPr>
+          <a:xfrm>
+            <a:off x="7598486" y="4358636"/>
+            <a:ext cx="2287792" cy="1149276"/>
+            <a:chOff x="7598486" y="4358636"/>
+            <a:chExt cx="2287792" cy="1149276"/>
+          </a:xfrm>
+        </p:grpSpPr>
+        <p:sp>
+          <p:nvSpPr>
+            <p:cNvPr id="41" name="Rectangle 40">
+              <a:extLst>
+                <a:ext uri="{FF2B5EF4-FFF2-40B4-BE49-F238E27FC236}">
+                  <a16:creationId xmlns:a16="http://schemas.microsoft.com/office/drawing/2014/main" id="{BD5A6428-5C16-42EA-9025-56CF3725D0AC}"/>
+                </a:ext>
+              </a:extLst>
+            </p:cNvPr>
+            <p:cNvSpPr/>
+            <p:nvPr/>
+          </p:nvSpPr>
+          <p:spPr>
+            <a:xfrm>
+              <a:off x="7598486" y="4358636"/>
+              <a:ext cx="2287792" cy="1149276"/>
+            </a:xfrm>
+            <a:prstGeom prst="rect">
+              <a:avLst/>
+            </a:prstGeom>
+          </p:spPr>
+          <p:style>
+            <a:lnRef idx="2">
+              <a:schemeClr val="dk1"/>
+            </a:lnRef>
+            <a:fillRef idx="1">
+              <a:schemeClr val="lt1"/>
+            </a:fillRef>
+            <a:effectRef idx="0">
+              <a:schemeClr val="dk1"/>
+            </a:effectRef>
+            <a:fontRef idx="minor">
+              <a:schemeClr val="dk1"/>
+            </a:fontRef>
+          </p:style>
+          <p:txBody>
+            <a:bodyPr rtlCol="0" anchor="ctr"/>
+            <a:lstStyle/>
+            <a:p>
+              <a:pPr algn="ctr"/>
+              <a:r>
+                <a:rPr lang="en-US" sz="1400" b="1" dirty="0" err="1"/>
+                <a:t>MTGCardDecoratorTrample</a:t>
+              </a:r>
+              <a:endParaRPr lang="en-US" b="1" dirty="0"/>
+            </a:p>
+            <a:p>
+              <a:pPr algn="ctr"/>
+              <a:endParaRPr lang="en-US" dirty="0"/>
+            </a:p>
+            <a:p>
+              <a:pPr algn="ctr"/>
+              <a:endParaRPr lang="en-US" dirty="0"/>
+            </a:p>
+            <a:p>
+              <a:pPr algn="ctr"/>
+              <a:endParaRPr lang="en-US" dirty="0"/>
+            </a:p>
+          </p:txBody>
+        </p:sp>
+        <p:cxnSp>
+          <p:nvCxnSpPr>
+            <p:cNvPr id="42" name="Straight Connector 41">
+              <a:extLst>
+                <a:ext uri="{FF2B5EF4-FFF2-40B4-BE49-F238E27FC236}">
+                  <a16:creationId xmlns:a16="http://schemas.microsoft.com/office/drawing/2014/main" id="{88867DCC-8EC2-473C-A8EA-D5A2CF9D30EC}"/>
+                </a:ext>
+              </a:extLst>
+            </p:cNvPr>
+            <p:cNvCxnSpPr>
+              <a:cxnSpLocks/>
+            </p:cNvCxnSpPr>
+            <p:nvPr/>
+          </p:nvCxnSpPr>
+          <p:spPr>
+            <a:xfrm>
+              <a:off x="7598486" y="4679575"/>
+              <a:ext cx="2287792" cy="0"/>
+            </a:xfrm>
+            <a:prstGeom prst="line">
+              <a:avLst/>
+            </a:prstGeom>
+            <a:ln>
+              <a:solidFill>
+                <a:schemeClr val="tx1"/>
+              </a:solidFill>
+            </a:ln>
+          </p:spPr>
+          <p:style>
+            <a:lnRef idx="1">
+              <a:schemeClr val="accent1"/>
+            </a:lnRef>
+            <a:fillRef idx="0">
+              <a:schemeClr val="accent1"/>
+            </a:fillRef>
+            <a:effectRef idx="0">
+              <a:schemeClr val="accent1"/>
+            </a:effectRef>
+            <a:fontRef idx="minor">
+              <a:schemeClr val="tx1"/>
+            </a:fontRef>
+          </p:style>
+        </p:cxnSp>
+      </p:grpSp>
+      <p:grpSp>
+        <p:nvGrpSpPr>
+          <p:cNvPr id="56" name="Group 55">
+            <a:extLst>
+              <a:ext uri="{FF2B5EF4-FFF2-40B4-BE49-F238E27FC236}">
+                <a16:creationId xmlns:a16="http://schemas.microsoft.com/office/drawing/2014/main" id="{48A34174-5025-4E31-BC84-F09747B32713}"/>
+              </a:ext>
+            </a:extLst>
+          </p:cNvPr>
+          <p:cNvGrpSpPr/>
+          <p:nvPr/>
+        </p:nvGrpSpPr>
+        <p:grpSpPr>
+          <a:xfrm>
+            <a:off x="4429463" y="4358636"/>
+            <a:ext cx="2380127" cy="1149276"/>
+            <a:chOff x="4429463" y="4358636"/>
+            <a:chExt cx="2380127" cy="1149276"/>
+          </a:xfrm>
+        </p:grpSpPr>
+        <p:sp>
+          <p:nvSpPr>
+            <p:cNvPr id="44" name="Rectangle 43">
+              <a:extLst>
+                <a:ext uri="{FF2B5EF4-FFF2-40B4-BE49-F238E27FC236}">
+                  <a16:creationId xmlns:a16="http://schemas.microsoft.com/office/drawing/2014/main" id="{A4B133CC-D577-4E5F-9658-E4D7B14CECDB}"/>
+                </a:ext>
+              </a:extLst>
+            </p:cNvPr>
+            <p:cNvSpPr/>
+            <p:nvPr/>
+          </p:nvSpPr>
+          <p:spPr>
+            <a:xfrm>
+              <a:off x="4429464" y="4358636"/>
+              <a:ext cx="2380126" cy="1149276"/>
+            </a:xfrm>
+            <a:prstGeom prst="rect">
+              <a:avLst/>
+            </a:prstGeom>
+          </p:spPr>
+          <p:style>
+            <a:lnRef idx="2">
+              <a:schemeClr val="dk1"/>
+            </a:lnRef>
+            <a:fillRef idx="1">
+              <a:schemeClr val="lt1"/>
+            </a:fillRef>
+            <a:effectRef idx="0">
+              <a:schemeClr val="dk1"/>
+            </a:effectRef>
+            <a:fontRef idx="minor">
+              <a:schemeClr val="dk1"/>
+            </a:fontRef>
+          </p:style>
+          <p:txBody>
+            <a:bodyPr rtlCol="0" anchor="ctr"/>
+            <a:lstStyle/>
+            <a:p>
+              <a:pPr algn="ctr"/>
+              <a:r>
+                <a:rPr lang="en-US" sz="1400" b="1" dirty="0" err="1"/>
+                <a:t>MTGCardDecoratorFirstStrike</a:t>
+              </a:r>
+              <a:endParaRPr lang="en-US" b="1" dirty="0"/>
+            </a:p>
+            <a:p>
+              <a:pPr algn="ctr"/>
+              <a:endParaRPr lang="en-US" dirty="0"/>
+            </a:p>
+            <a:p>
+              <a:pPr algn="ctr"/>
+              <a:endParaRPr lang="en-US" dirty="0"/>
+            </a:p>
+            <a:p>
+              <a:pPr algn="ctr"/>
+              <a:endParaRPr lang="en-US" dirty="0"/>
+            </a:p>
+          </p:txBody>
+        </p:sp>
+        <p:cxnSp>
+          <p:nvCxnSpPr>
+            <p:cNvPr id="45" name="Straight Connector 44">
+              <a:extLst>
+                <a:ext uri="{FF2B5EF4-FFF2-40B4-BE49-F238E27FC236}">
+                  <a16:creationId xmlns:a16="http://schemas.microsoft.com/office/drawing/2014/main" id="{86DEADD1-3E31-438D-8D56-80E0C5F0D5CD}"/>
+                </a:ext>
+              </a:extLst>
+            </p:cNvPr>
+            <p:cNvCxnSpPr>
+              <a:cxnSpLocks/>
+            </p:cNvCxnSpPr>
+            <p:nvPr/>
+          </p:nvCxnSpPr>
+          <p:spPr>
+            <a:xfrm>
+              <a:off x="4429463" y="4679575"/>
+              <a:ext cx="2380126" cy="0"/>
+            </a:xfrm>
+            <a:prstGeom prst="line">
+              <a:avLst/>
+            </a:prstGeom>
+            <a:ln>
+              <a:solidFill>
+                <a:schemeClr val="tx1"/>
+              </a:solidFill>
+            </a:ln>
+          </p:spPr>
+          <p:style>
+            <a:lnRef idx="1">
+              <a:schemeClr val="accent1"/>
+            </a:lnRef>
+            <a:fillRef idx="0">
+              <a:schemeClr val="accent1"/>
+            </a:fillRef>
+            <a:effectRef idx="0">
+              <a:schemeClr val="accent1"/>
+            </a:effectRef>
+            <a:fontRef idx="minor">
+              <a:schemeClr val="tx1"/>
+            </a:fontRef>
+          </p:style>
+        </p:cxnSp>
+      </p:grpSp>
+      <p:sp>
+        <p:nvSpPr>
+          <p:cNvPr id="46" name="Isosceles Triangle 45">
+            <a:extLst>
+              <a:ext uri="{FF2B5EF4-FFF2-40B4-BE49-F238E27FC236}">
+                <a16:creationId xmlns:a16="http://schemas.microsoft.com/office/drawing/2014/main" id="{9FAC402F-344D-4DA3-8A8E-41519688A18B}"/>
+              </a:ext>
+            </a:extLst>
+          </p:cNvPr>
+          <p:cNvSpPr/>
+          <p:nvPr/>
+        </p:nvSpPr>
+        <p:spPr>
+          <a:xfrm>
+            <a:off x="6598474" y="3668356"/>
+            <a:ext cx="161364" cy="193637"/>
+          </a:xfrm>
+          <a:prstGeom prst="triangle">
+            <a:avLst/>
+          </a:prstGeom>
+        </p:spPr>
+        <p:style>
+          <a:lnRef idx="2">
+            <a:schemeClr val="dk1"/>
+          </a:lnRef>
+          <a:fillRef idx="1">
+            <a:schemeClr val="lt1"/>
+          </a:fillRef>
+          <a:effectRef idx="0">
+            <a:schemeClr val="dk1"/>
+          </a:effectRef>
+          <a:fontRef idx="minor">
+            <a:schemeClr val="dk1"/>
+          </a:fontRef>
+        </p:style>
+        <p:txBody>
+          <a:bodyPr rtlCol="0" anchor="ctr"/>
+          <a:lstStyle/>
+          <a:p>
+            <a:pPr algn="ctr"/>
+            <a:endParaRPr lang="en-US"/>
+          </a:p>
+        </p:txBody>
+      </p:sp>
+      <p:sp>
+        <p:nvSpPr>
+          <p:cNvPr id="47" name="Isosceles Triangle 46">
+            <a:extLst>
+              <a:ext uri="{FF2B5EF4-FFF2-40B4-BE49-F238E27FC236}">
+                <a16:creationId xmlns:a16="http://schemas.microsoft.com/office/drawing/2014/main" id="{2EDC1728-7BD4-430E-BAC3-940965BA672B}"/>
+              </a:ext>
+            </a:extLst>
+          </p:cNvPr>
+          <p:cNvSpPr/>
+          <p:nvPr/>
+        </p:nvSpPr>
+        <p:spPr>
+          <a:xfrm>
+            <a:off x="7620450" y="3668356"/>
+            <a:ext cx="161364" cy="193637"/>
+          </a:xfrm>
+          <a:prstGeom prst="triangle">
+            <a:avLst/>
+          </a:prstGeom>
+        </p:spPr>
+        <p:style>
+          <a:lnRef idx="2">
+            <a:schemeClr val="dk1"/>
+          </a:lnRef>
+          <a:fillRef idx="1">
+            <a:schemeClr val="lt1"/>
+          </a:fillRef>
+          <a:effectRef idx="0">
+            <a:schemeClr val="dk1"/>
+          </a:effectRef>
+          <a:fontRef idx="minor">
+            <a:schemeClr val="dk1"/>
+          </a:fontRef>
+        </p:style>
+        <p:txBody>
+          <a:bodyPr rtlCol="0" anchor="ctr"/>
+          <a:lstStyle/>
+          <a:p>
+            <a:pPr algn="ctr"/>
+            <a:endParaRPr lang="en-US"/>
+          </a:p>
+        </p:txBody>
+      </p:sp>
+      <p:cxnSp>
+        <p:nvCxnSpPr>
+          <p:cNvPr id="49" name="Connector: Elbow 48">
+            <a:extLst>
+              <a:ext uri="{FF2B5EF4-FFF2-40B4-BE49-F238E27FC236}">
+                <a16:creationId xmlns:a16="http://schemas.microsoft.com/office/drawing/2014/main" id="{1C3FF708-F0D8-46ED-9C17-8CA813E0BE4A}"/>
+              </a:ext>
+            </a:extLst>
+          </p:cNvPr>
+          <p:cNvCxnSpPr>
+            <a:cxnSpLocks/>
+            <a:stCxn id="44" idx="0"/>
+            <a:endCxn id="46" idx="3"/>
+          </p:cNvCxnSpPr>
+          <p:nvPr/>
+        </p:nvCxnSpPr>
+        <p:spPr>
+          <a:xfrm rot="5400000" flipH="1" flipV="1">
+            <a:off x="5901020" y="3580501"/>
+            <a:ext cx="496643" cy="1059629"/>
+          </a:xfrm>
+          <a:prstGeom prst="bentConnector3">
+            <a:avLst/>
+          </a:prstGeom>
+          <a:ln>
+            <a:solidFill>
+              <a:schemeClr val="tx1"/>
+            </a:solidFill>
+          </a:ln>
+        </p:spPr>
+        <p:style>
+          <a:lnRef idx="1">
+            <a:schemeClr val="accent1"/>
+          </a:lnRef>
+          <a:fillRef idx="0">
+            <a:schemeClr val="accent1"/>
+          </a:fillRef>
+          <a:effectRef idx="0">
+            <a:schemeClr val="accent1"/>
+          </a:effectRef>
+          <a:fontRef idx="minor">
+            <a:schemeClr val="tx1"/>
+          </a:fontRef>
+        </p:style>
+      </p:cxnSp>
+      <p:cxnSp>
+        <p:nvCxnSpPr>
+          <p:cNvPr id="51" name="Connector: Elbow 50">
+            <a:extLst>
+              <a:ext uri="{FF2B5EF4-FFF2-40B4-BE49-F238E27FC236}">
+                <a16:creationId xmlns:a16="http://schemas.microsoft.com/office/drawing/2014/main" id="{56E45040-B7B1-4830-A835-B64ECCE8131F}"/>
+              </a:ext>
+            </a:extLst>
+          </p:cNvPr>
+          <p:cNvCxnSpPr>
+            <a:cxnSpLocks/>
+            <a:stCxn id="41" idx="0"/>
+            <a:endCxn id="47" idx="3"/>
+          </p:cNvCxnSpPr>
+          <p:nvPr/>
+        </p:nvCxnSpPr>
+        <p:spPr>
+          <a:xfrm rot="16200000" flipV="1">
+            <a:off x="7973436" y="3589690"/>
+            <a:ext cx="496643" cy="1041250"/>
+          </a:xfrm>
+          <a:prstGeom prst="bentConnector3">
+            <a:avLst/>
+          </a:prstGeom>
+          <a:ln>
+            <a:solidFill>
+              <a:schemeClr val="tx1"/>
+            </a:solidFill>
+          </a:ln>
+        </p:spPr>
+        <p:style>
+          <a:lnRef idx="1">
+            <a:schemeClr val="accent1"/>
+          </a:lnRef>
+          <a:fillRef idx="0">
+            <a:schemeClr val="accent1"/>
+          </a:fillRef>
+          <a:effectRef idx="0">
+            <a:schemeClr val="accent1"/>
+          </a:effectRef>
+          <a:fontRef idx="minor">
+            <a:schemeClr val="tx1"/>
+          </a:fontRef>
+        </p:style>
+      </p:cxnSp>
+    </p:spTree>
+    <p:extLst>
+      <p:ext uri="{BB962C8B-B14F-4D97-AF65-F5344CB8AC3E}">
+        <p14:creationId xmlns:p14="http://schemas.microsoft.com/office/powerpoint/2010/main" val="1573230160"/>
       </p:ext>
     </p:extLst>
   </p:cSld>

</xml_diff>